<commit_message>
Minor update to poster.
</commit_message>
<xml_diff>
--- a/doc/CEWIT_2013_Poster.pptx
+++ b/doc/CEWIT_2013_Poster.pptx
@@ -10264,7 +10264,7 @@
         <p:spPr bwMode="auto">
           <a:xfrm>
             <a:off x="20826413" y="3567114"/>
-            <a:ext cx="5919787" cy="12095619"/>
+            <a:ext cx="5919787" cy="12711172"/>
           </a:xfrm>
           <a:prstGeom prst="rect">
             <a:avLst/>
@@ -10362,17 +10362,8 @@
             </a:r>
             <a:r>
               <a:rPr lang="en-US" sz="2000" dirty="0" smtClean="0"/>
-              <a:t> </a:t>
-            </a:r>
-            <a:r>
-              <a:rPr lang="en-US" sz="2000" dirty="0" smtClean="0"/>
-              <a:t>rules are placed in the class for the role they check for </a:t>
-            </a:r>
-            <a:r>
-              <a:rPr lang="en-US" sz="2000" dirty="0" smtClean="0"/>
-              <a:t>activation.</a:t>
-            </a:r>
-            <a:endParaRPr lang="en-US" sz="2000" dirty="0" smtClean="0"/>
+              <a:t> rules are placed in the class for the role they check for activation.</a:t>
+            </a:r>
           </a:p>
           <a:p>
             <a:pPr lvl="1">
@@ -10400,15 +10391,7 @@
             </a:r>
             <a:r>
               <a:rPr lang="en-US" sz="2000" dirty="0" smtClean="0"/>
-              <a:t> </a:t>
-            </a:r>
-            <a:r>
-              <a:rPr lang="en-US" sz="2000" dirty="0" smtClean="0"/>
-              <a:t>rules are placed in the class for the role they check for </a:t>
-            </a:r>
-            <a:r>
-              <a:rPr lang="en-US" sz="2000" dirty="0" smtClean="0"/>
-              <a:t>de-activation.</a:t>
+              <a:t> rules are placed in the class for the role they check for de-activation.</a:t>
             </a:r>
           </a:p>
           <a:p>
@@ -10437,23 +10420,7 @@
             </a:r>
             <a:r>
               <a:rPr lang="en-US" sz="2000" dirty="0" smtClean="0"/>
-              <a:t> </a:t>
-            </a:r>
-            <a:r>
-              <a:rPr lang="en-US" sz="2000" dirty="0" smtClean="0"/>
-              <a:t>rules are placed in the </a:t>
-            </a:r>
-            <a:r>
-              <a:rPr lang="en-US" sz="2000" dirty="0" smtClean="0"/>
-              <a:t>triggering </a:t>
-            </a:r>
-            <a:r>
-              <a:rPr lang="en-US" sz="2000" dirty="0" smtClean="0"/>
-              <a:t>role’s class</a:t>
-            </a:r>
-            <a:r>
-              <a:rPr lang="en-US" sz="2000" dirty="0" smtClean="0"/>
-              <a:t>.</a:t>
+              <a:t> rules are placed in the triggering role’s class.</a:t>
             </a:r>
           </a:p>
           <a:p>
@@ -10479,6 +10446,43 @@
             <a:r>
               <a:rPr lang="en-US" sz="2000" dirty="0" smtClean="0"/>
               <a:t>: Rules beginning with the predicate </a:t>
+            </a:r>
+            <a:r>
+              <a:rPr lang="en-US" sz="2000" dirty="0" smtClean="0">
+                <a:solidFill>
+                  <a:srgbClr val="0070C0"/>
+                </a:solidFill>
+              </a:rPr>
+              <a:t>permits </a:t>
+            </a:r>
+            <a:r>
+              <a:rPr lang="en-US" sz="2000" dirty="0" smtClean="0"/>
+              <a:t>are used to verify whether a user has permission to perform a certain </a:t>
+            </a:r>
+            <a:r>
+              <a:rPr lang="en-US" sz="2000" i="1" dirty="0" smtClean="0"/>
+              <a:t>action</a:t>
+            </a:r>
+            <a:r>
+              <a:rPr lang="en-US" sz="2000" dirty="0" smtClean="0"/>
+              <a:t>.</a:t>
+            </a:r>
+          </a:p>
+          <a:p>
+            <a:pPr lvl="1">
+              <a:buFont typeface="Arial" charset="0"/>
+              <a:buChar char="•"/>
+            </a:pPr>
+            <a:endParaRPr lang="en-US" sz="2000" dirty="0" smtClean="0"/>
+          </a:p>
+          <a:p>
+            <a:pPr lvl="2">
+              <a:buFont typeface="Arial" charset="0"/>
+              <a:buChar char="•"/>
+            </a:pPr>
+            <a:r>
+              <a:rPr lang="en-US" sz="2000" dirty="0" smtClean="0"/>
+              <a:t> </a:t>
             </a:r>
             <a:r>
               <a:rPr lang="en-US" sz="2000" dirty="0" smtClean="0">
@@ -10489,61 +10493,8 @@
               <a:t>permits</a:t>
             </a:r>
             <a:r>
-              <a:rPr lang="en-US" sz="2000" dirty="0" smtClean="0">
-                <a:solidFill>
-                  <a:srgbClr val="0070C0"/>
-                </a:solidFill>
-              </a:rPr>
-              <a:t> </a:t>
-            </a:r>
-            <a:r>
-              <a:rPr lang="en-US" sz="2000" dirty="0" smtClean="0"/>
-              <a:t>are used </a:t>
-            </a:r>
-            <a:r>
-              <a:rPr lang="en-US" sz="2000" dirty="0" smtClean="0"/>
-              <a:t>to verify whether a user has permission to perform a certain </a:t>
-            </a:r>
-            <a:r>
-              <a:rPr lang="en-US" sz="2000" i="1" dirty="0" smtClean="0"/>
-              <a:t>action</a:t>
-            </a:r>
-            <a:r>
-              <a:rPr lang="en-US" sz="2000" dirty="0" smtClean="0"/>
-              <a:t>.</a:t>
-            </a:r>
-          </a:p>
-          <a:p>
-            <a:pPr lvl="1">
-              <a:buFont typeface="Arial" charset="0"/>
-              <a:buChar char="•"/>
-            </a:pPr>
-            <a:endParaRPr lang="en-US" sz="2000" dirty="0" smtClean="0"/>
-          </a:p>
-          <a:p>
-            <a:pPr lvl="2">
-              <a:buFont typeface="Arial" charset="0"/>
-              <a:buChar char="•"/>
-            </a:pPr>
-            <a:r>
-              <a:rPr lang="en-US" sz="2000" dirty="0" smtClean="0"/>
-              <a:t> </a:t>
-            </a:r>
-            <a:r>
-              <a:rPr lang="en-US" sz="2000" dirty="0" smtClean="0">
-                <a:solidFill>
-                  <a:srgbClr val="0070C0"/>
-                </a:solidFill>
-              </a:rPr>
-              <a:t>permits</a:t>
-            </a:r>
-            <a:r>
-              <a:rPr lang="en-US" sz="2000" dirty="0" smtClean="0"/>
-              <a:t> </a:t>
-            </a:r>
-            <a:r>
-              <a:rPr lang="en-US" sz="2000" dirty="0" smtClean="0"/>
-              <a:t>rules check if the </a:t>
+              <a:rPr lang="en-US" sz="2000" dirty="0" smtClean="0"/>
+              <a:t> rules check if the </a:t>
             </a:r>
             <a:r>
               <a:rPr lang="en-US" sz="2000" i="1" dirty="0" smtClean="0"/>
@@ -10573,7 +10524,6 @@
               <a:rPr lang="en-US" sz="2000" dirty="0" smtClean="0"/>
               <a:t>.</a:t>
             </a:r>
-            <a:endParaRPr lang="en-US" sz="2000" dirty="0" smtClean="0"/>
           </a:p>
           <a:p>
             <a:pPr lvl="2">
@@ -10625,15 +10575,7 @@
             </a:br>
             <a:r>
               <a:rPr lang="en-US" sz="2000" dirty="0" smtClean="0"/>
-              <a:t>   rules, and handles them differently.</a:t>
-            </a:r>
-            <a:r>
-              <a:rPr lang="en-US" sz="2000" dirty="0" smtClean="0"/>
-              <a:t> </a:t>
-            </a:r>
-            <a:r>
-              <a:rPr lang="en-US" sz="2000" dirty="0" smtClean="0"/>
-              <a:t>E.g. </a:t>
+              <a:t>   rules, and handles them differently. E.g. </a:t>
             </a:r>
             <a:r>
               <a:rPr lang="en-US" sz="2000" b="1" dirty="0" smtClean="0"/>
@@ -10660,15 +10602,7 @@
             </a:r>
             <a:r>
               <a:rPr lang="en-US" sz="2000" dirty="0" smtClean="0"/>
-              <a:t>(n</a:t>
-            </a:r>
-            <a:r>
-              <a:rPr lang="en-US" sz="2000" dirty="0" smtClean="0"/>
-              <a:t>, a, b</a:t>
-            </a:r>
-            <a:r>
-              <a:rPr lang="en-US" sz="2000" dirty="0" smtClean="0"/>
-              <a:t>)</a:t>
+              <a:t>(n, a, b)</a:t>
             </a:r>
             <a:br>
               <a:rPr lang="en-US" sz="2000" dirty="0" smtClean="0"/>
@@ -10712,8 +10646,30 @@
             </a:br>
             <a:r>
               <a:rPr lang="en-US" sz="2000" dirty="0" smtClean="0"/>
-              <a:t>   all hypotheses are satisfied.</a:t>
-            </a:r>
+              <a:t>   all hypotheses are satisfied</a:t>
+            </a:r>
+            <a:r>
+              <a:rPr lang="en-US" sz="2000" dirty="0" smtClean="0"/>
+              <a:t>.</a:t>
+            </a:r>
+          </a:p>
+          <a:p>
+            <a:pPr lvl="1">
+              <a:buFont typeface="Arial" charset="0"/>
+              <a:buChar char="•"/>
+            </a:pPr>
+            <a:endParaRPr lang="en-US" sz="2000" dirty="0" smtClean="0"/>
+          </a:p>
+          <a:p>
+            <a:pPr lvl="1">
+              <a:buFont typeface="Arial" charset="0"/>
+              <a:buChar char="•"/>
+            </a:pPr>
+            <a:r>
+              <a:rPr lang="en-US" sz="2000" dirty="0" smtClean="0"/>
+              <a:t> Set expressions allow for incrementalization. [Liu08]</a:t>
+            </a:r>
+            <a:endParaRPr lang="en-US" sz="2000" dirty="0" smtClean="0"/>
           </a:p>
           <a:p>
             <a:pPr>
@@ -10817,7 +10773,6 @@
               <a:rPr lang="en-US" sz="2000" dirty="0" smtClean="0"/>
               <a:t>) </a:t>
             </a:r>
-            <a:endParaRPr lang="en-US" sz="2000" dirty="0" smtClean="0"/>
           </a:p>
           <a:p>
             <a:endParaRPr lang="en-US" sz="2000" dirty="0" smtClean="0"/>
@@ -11252,13 +11207,8 @@
             </a:r>
             <a:r>
               <a:rPr lang="en-US" sz="2000" dirty="0" smtClean="0"/>
-              <a:t>)) </a:t>
-            </a:r>
-            <a:r>
-              <a:rPr lang="en-US" sz="2000" dirty="0" smtClean="0"/>
-              <a:t>&lt;-</a:t>
-            </a:r>
-            <a:endParaRPr lang="en-US" sz="2000" dirty="0" smtClean="0"/>
+              <a:t>)) &lt;-</a:t>
+            </a:r>
           </a:p>
         </p:txBody>
       </p:sp>

</xml_diff>